<commit_message>
Metriche 24 aprile post ultima call con Michielli
</commit_message>
<xml_diff>
--- a/Presentations/Report Aprile 2024/Bassolino_Uncertainty_Report_Aprile2024.pptx
+++ b/Presentations/Report Aprile 2024/Bassolino_Uncertainty_Report_Aprile2024.pptx
@@ -355,7 +355,7 @@
             <a:pPr rtl="0"/>
             <a:fld id="{FD6C7549-0246-44BA-93A9-40F12E42018F}" type="datetime1">
               <a:rPr lang="it-IT" smtClean="0"/>
-              <a:t>18/04/2024</a:t>
+              <a:t>19/04/2024</a:t>
             </a:fld>
             <a:endParaRPr lang="it-IT" dirty="0"/>
           </a:p>
@@ -537,7 +537,7 @@
             <a:pPr rtl="0"/>
             <a:fld id="{A8115AD7-15A0-4B5C-986D-26C693CFC79C}" type="datetime1">
               <a:rPr lang="it-IT" smtClean="0"/>
-              <a:t>18/04/2024</a:t>
+              <a:t>19/04/2024</a:t>
             </a:fld>
             <a:endParaRPr lang="it-IT" dirty="0"/>
           </a:p>
@@ -20650,8 +20650,8 @@
           </a:p>
         </p:txBody>
       </p:sp>
-      <mc:AlternateContent xmlns:mc="http://schemas.openxmlformats.org/markup-compatibility/2006">
-        <mc:Choice xmlns:a14="http://schemas.microsoft.com/office/drawing/2010/main" Requires="a14">
+      <mc:AlternateContent xmlns:mc="http://schemas.openxmlformats.org/markup-compatibility/2006" xmlns:a14="http://schemas.microsoft.com/office/drawing/2010/main">
+        <mc:Choice Requires="a14">
           <p:sp>
             <p:nvSpPr>
               <p:cNvPr id="7" name="Segnaposto testo 6">
@@ -21009,7 +21009,7 @@
             </p:txBody>
           </p:sp>
         </mc:Choice>
-        <mc:Fallback>
+        <mc:Fallback xmlns="">
           <p:sp>
             <p:nvSpPr>
               <p:cNvPr id="7" name="Segnaposto testo 6">
@@ -21476,25 +21476,7 @@
             </a:pPr>
             <a:r>
               <a:rPr lang="en-GB" dirty="0"/>
-              <a:t>(b) The percentage of total instances considered, given a threshold τ. For the red dashed line, we use the boundary</a:t>
-            </a:r>
-          </a:p>
-          <a:p>
-            <a:pPr rtl="0">
-              <a:lnSpc>
-                <a:spcPct val="100000"/>
-              </a:lnSpc>
-              <a:spcBef>
-                <a:spcPts val="0"/>
-              </a:spcBef>
-              <a:spcAft>
-                <a:spcPts val="0"/>
-              </a:spcAft>
-              <a:buSzPct val="95000"/>
-            </a:pPr>
-            <a:r>
-              <a:rPr lang="en-GB" dirty="0"/>
-              <a:t>removed uncertainty map, whereas for the blue dashed line we use the standard uncertainty map. The black horizontal line shows the F1 score when no glands with a high uncertainty are removed. </a:t>
+              <a:t>(b) The percentage of total instances considered, given a threshold τ. For the red dashed line, we use the boundary removed uncertainty map, whereas for the blue dashed line we use the standard uncertainty map. The black horizontal line shows the F1 score when no glands with a high uncertainty are removed. </a:t>
             </a:r>
           </a:p>
           <a:p>
@@ -25389,8 +25371,8 @@
           </a:p>
         </p:txBody>
       </p:sp>
-      <mc:AlternateContent xmlns:mc="http://schemas.openxmlformats.org/markup-compatibility/2006">
-        <mc:Choice xmlns:a14="http://schemas.microsoft.com/office/drawing/2010/main" Requires="a14">
+      <mc:AlternateContent xmlns:mc="http://schemas.openxmlformats.org/markup-compatibility/2006" xmlns:a14="http://schemas.microsoft.com/office/drawing/2010/main">
+        <mc:Choice Requires="a14">
           <p:sp>
             <p:nvSpPr>
               <p:cNvPr id="9" name="Segnaposto contenuto 3">
@@ -25654,7 +25636,7 @@
             </p:txBody>
           </p:sp>
         </mc:Choice>
-        <mc:Fallback>
+        <mc:Fallback xmlns="">
           <p:sp>
             <p:nvSpPr>
               <p:cNvPr id="9" name="Segnaposto contenuto 3">
@@ -30807,7 +30789,7 @@
             </a:pPr>
             <a:r>
               <a:rPr lang="en-GB" sz="2400" dirty="0"/>
-              <a:t>Papers: 9</a:t>
+              <a:t>Paper: 9</a:t>
             </a:r>
           </a:p>
           <a:p>
@@ -30842,7 +30824,7 @@
             </a:pPr>
             <a:r>
               <a:rPr lang="en-GB" sz="2400" dirty="0"/>
-              <a:t>Papers: 5,6,8</a:t>
+              <a:t>Papers: 3,5,6,8</a:t>
             </a:r>
           </a:p>
           <a:p>
@@ -31990,8 +31972,8 @@
         </p:nvSpPr>
         <p:spPr>
           <a:xfrm>
-            <a:off x="1138334" y="4543962"/>
-            <a:ext cx="4324817" cy="690989"/>
+            <a:off x="1138335" y="4543962"/>
+            <a:ext cx="3489650" cy="690989"/>
           </a:xfrm>
           <a:prstGeom prst="rect">
             <a:avLst/>
@@ -39853,12 +39835,23 @@
 </file>
 
 <file path=customXml/item1.xml><?xml version="1.0" encoding="utf-8"?>
-<?mso-contentType ?>
-<FormTemplates xmlns="http://schemas.microsoft.com/sharepoint/v3/contenttype/forms">
-  <Display>DocumentLibraryForm</Display>
-  <Edit>DocumentLibraryForm</Edit>
-  <New>DocumentLibraryForm</New>
-</FormTemplates>
+<p:properties xmlns:p="http://schemas.microsoft.com/office/2006/metadata/properties" xmlns:xsi="http://www.w3.org/2001/XMLSchema-instance" xmlns:pc="http://schemas.microsoft.com/office/infopath/2007/PartnerControls">
+  <documentManagement>
+    <_ip_UnifiedCompliancePolicyUIAction xmlns="http://schemas.microsoft.com/sharepoint/v3" xsi:nil="true"/>
+    <Image xmlns="71af3243-3dd4-4a8d-8c0d-dd76da1f02a5">
+      <Url xsi:nil="true"/>
+      <Description xsi:nil="true"/>
+    </Image>
+    <Status xmlns="71af3243-3dd4-4a8d-8c0d-dd76da1f02a5">Not started</Status>
+    <Background xmlns="71af3243-3dd4-4a8d-8c0d-dd76da1f02a5">false</Background>
+    <_ip_UnifiedCompliancePolicyProperties xmlns="http://schemas.microsoft.com/sharepoint/v3" xsi:nil="true"/>
+    <ImageTagsTaxHTField xmlns="71af3243-3dd4-4a8d-8c0d-dd76da1f02a5">
+      <Terms xmlns="http://schemas.microsoft.com/office/infopath/2007/PartnerControls"/>
+    </ImageTagsTaxHTField>
+    <TaxCatchAll xmlns="230e9df3-be65-4c73-a93b-d1236ebd677e" xsi:nil="true"/>
+    <MediaServiceKeyPoints xmlns="71af3243-3dd4-4a8d-8c0d-dd76da1f02a5" xsi:nil="true"/>
+  </documentManagement>
+</p:properties>
 </file>
 
 <file path=customXml/item2.xml><?xml version="1.0" encoding="utf-8"?>
@@ -40156,29 +40149,29 @@
 </file>
 
 <file path=customXml/item3.xml><?xml version="1.0" encoding="utf-8"?>
-<p:properties xmlns:p="http://schemas.microsoft.com/office/2006/metadata/properties" xmlns:xsi="http://www.w3.org/2001/XMLSchema-instance" xmlns:pc="http://schemas.microsoft.com/office/infopath/2007/PartnerControls">
-  <documentManagement>
-    <_ip_UnifiedCompliancePolicyUIAction xmlns="http://schemas.microsoft.com/sharepoint/v3" xsi:nil="true"/>
-    <Image xmlns="71af3243-3dd4-4a8d-8c0d-dd76da1f02a5">
-      <Url xsi:nil="true"/>
-      <Description xsi:nil="true"/>
-    </Image>
-    <Status xmlns="71af3243-3dd4-4a8d-8c0d-dd76da1f02a5">Not started</Status>
-    <Background xmlns="71af3243-3dd4-4a8d-8c0d-dd76da1f02a5">false</Background>
-    <_ip_UnifiedCompliancePolicyProperties xmlns="http://schemas.microsoft.com/sharepoint/v3" xsi:nil="true"/>
-    <ImageTagsTaxHTField xmlns="71af3243-3dd4-4a8d-8c0d-dd76da1f02a5">
-      <Terms xmlns="http://schemas.microsoft.com/office/infopath/2007/PartnerControls"/>
-    </ImageTagsTaxHTField>
-    <TaxCatchAll xmlns="230e9df3-be65-4c73-a93b-d1236ebd677e" xsi:nil="true"/>
-    <MediaServiceKeyPoints xmlns="71af3243-3dd4-4a8d-8c0d-dd76da1f02a5" xsi:nil="true"/>
-  </documentManagement>
-</p:properties>
+<?mso-contentType ?>
+<FormTemplates xmlns="http://schemas.microsoft.com/sharepoint/v3/contenttype/forms">
+  <Display>DocumentLibraryForm</Display>
+  <Edit>DocumentLibraryForm</Edit>
+  <New>DocumentLibraryForm</New>
+</FormTemplates>
 </file>
 
 <file path=customXml/itemProps1.xml><?xml version="1.0" encoding="utf-8"?>
-<ds:datastoreItem xmlns:ds="http://schemas.openxmlformats.org/officeDocument/2006/customXml" ds:itemID="{0E8B3377-22F1-4153-96F0-CC2E4BE41C57}">
+<ds:datastoreItem xmlns:ds="http://schemas.openxmlformats.org/officeDocument/2006/customXml" ds:itemID="{99746342-5E84-430E-9251-61001F208E7A}">
   <ds:schemaRefs>
-    <ds:schemaRef ds:uri="http://schemas.microsoft.com/sharepoint/v3/contenttype/forms"/>
+    <ds:schemaRef ds:uri="http://www.w3.org/XML/1998/namespace"/>
+    <ds:schemaRef ds:uri="http://purl.org/dc/dcmitype/"/>
+    <ds:schemaRef ds:uri="http://schemas.microsoft.com/office/2006/documentManagement/types"/>
+    <ds:schemaRef ds:uri="71af3243-3dd4-4a8d-8c0d-dd76da1f02a5"/>
+    <ds:schemaRef ds:uri="http://purl.org/dc/terms/"/>
+    <ds:schemaRef ds:uri="http://purl.org/dc/elements/1.1/"/>
+    <ds:schemaRef ds:uri="http://schemas.microsoft.com/sharepoint/v3"/>
+    <ds:schemaRef ds:uri="230e9df3-be65-4c73-a93b-d1236ebd677e"/>
+    <ds:schemaRef ds:uri="http://schemas.microsoft.com/office/2006/metadata/properties"/>
+    <ds:schemaRef ds:uri="http://schemas.microsoft.com/office/infopath/2007/PartnerControls"/>
+    <ds:schemaRef ds:uri="http://schemas.openxmlformats.org/package/2006/metadata/core-properties"/>
+    <ds:schemaRef ds:uri="16c05727-aa75-4e4a-9b5f-8a80a1165891"/>
   </ds:schemaRefs>
 </ds:datastoreItem>
 </file>
@@ -40205,20 +40198,9 @@
 </file>
 
 <file path=customXml/itemProps3.xml><?xml version="1.0" encoding="utf-8"?>
-<ds:datastoreItem xmlns:ds="http://schemas.openxmlformats.org/officeDocument/2006/customXml" ds:itemID="{99746342-5E84-430E-9251-61001F208E7A}">
+<ds:datastoreItem xmlns:ds="http://schemas.openxmlformats.org/officeDocument/2006/customXml" ds:itemID="{0E8B3377-22F1-4153-96F0-CC2E4BE41C57}">
   <ds:schemaRefs>
-    <ds:schemaRef ds:uri="http://www.w3.org/XML/1998/namespace"/>
-    <ds:schemaRef ds:uri="http://purl.org/dc/dcmitype/"/>
-    <ds:schemaRef ds:uri="http://schemas.microsoft.com/office/2006/documentManagement/types"/>
-    <ds:schemaRef ds:uri="71af3243-3dd4-4a8d-8c0d-dd76da1f02a5"/>
-    <ds:schemaRef ds:uri="http://purl.org/dc/terms/"/>
-    <ds:schemaRef ds:uri="http://purl.org/dc/elements/1.1/"/>
-    <ds:schemaRef ds:uri="http://schemas.microsoft.com/sharepoint/v3"/>
-    <ds:schemaRef ds:uri="230e9df3-be65-4c73-a93b-d1236ebd677e"/>
-    <ds:schemaRef ds:uri="http://schemas.microsoft.com/office/2006/metadata/properties"/>
-    <ds:schemaRef ds:uri="http://schemas.microsoft.com/office/infopath/2007/PartnerControls"/>
-    <ds:schemaRef ds:uri="http://schemas.openxmlformats.org/package/2006/metadata/core-properties"/>
-    <ds:schemaRef ds:uri="16c05727-aa75-4e4a-9b5f-8a80a1165891"/>
+    <ds:schemaRef ds:uri="http://schemas.microsoft.com/sharepoint/v3/contenttype/forms"/>
   </ds:schemaRefs>
 </ds:datastoreItem>
 </file>

</xml_diff>